<commit_message>
Actualización de mapa 10-04
</commit_message>
<xml_diff>
--- a/fuentes/contenidos/grado10/guion04/CN_10_04_CO.pptx
+++ b/fuentes/contenidos/grado10/guion04/CN_10_04_CO.pptx
@@ -3963,17 +3963,7 @@
                 <a:latin typeface="Arial" pitchFamily="34" charset="0"/>
                 <a:cs typeface="Arial" pitchFamily="34" charset="0"/>
               </a:rPr>
-              <a:t>uerzas </a:t>
-            </a:r>
-            <a:r>
-              <a:rPr lang="es-ES" sz="1000" dirty="0" smtClean="0">
-                <a:solidFill>
-                  <a:schemeClr val="bg1"/>
-                </a:solidFill>
-                <a:latin typeface="Arial" pitchFamily="34" charset="0"/>
-                <a:cs typeface="Arial" pitchFamily="34" charset="0"/>
-              </a:rPr>
-              <a:t>por contacto</a:t>
+              <a:t>uerzas por contacto</a:t>
             </a:r>
             <a:endParaRPr lang="es-ES" sz="1000" dirty="0">
               <a:solidFill>
@@ -4149,17 +4139,7 @@
                 <a:latin typeface="Arial" pitchFamily="34" charset="0"/>
                 <a:cs typeface="Arial" pitchFamily="34" charset="0"/>
               </a:rPr>
-              <a:t>ambios </a:t>
-            </a:r>
-            <a:r>
-              <a:rPr lang="es-ES" sz="900" dirty="0" smtClean="0">
-                <a:solidFill>
-                  <a:schemeClr val="tx1"/>
-                </a:solidFill>
-                <a:latin typeface="Arial" pitchFamily="34" charset="0"/>
-                <a:cs typeface="Arial" pitchFamily="34" charset="0"/>
-              </a:rPr>
-              <a:t>de velocidad</a:t>
+              <a:t>ambios de velocidad</a:t>
             </a:r>
           </a:p>
           <a:p>
@@ -4185,17 +4165,7 @@
                 <a:latin typeface="Arial" pitchFamily="34" charset="0"/>
                 <a:cs typeface="Arial" pitchFamily="34" charset="0"/>
               </a:rPr>
-              <a:t>eformación </a:t>
-            </a:r>
-            <a:r>
-              <a:rPr lang="es-ES" sz="900" dirty="0" smtClean="0">
-                <a:solidFill>
-                  <a:schemeClr val="tx1"/>
-                </a:solidFill>
-                <a:latin typeface="Arial" pitchFamily="34" charset="0"/>
-                <a:cs typeface="Arial" pitchFamily="34" charset="0"/>
-              </a:rPr>
-              <a:t>en los cuerpos</a:t>
+              <a:t>eformación en los cuerpos</a:t>
             </a:r>
           </a:p>
         </p:txBody>
@@ -4268,17 +4238,7 @@
                 <a:latin typeface="Arial" pitchFamily="34" charset="0"/>
                 <a:cs typeface="Arial" pitchFamily="34" charset="0"/>
               </a:rPr>
-              <a:t>uerza </a:t>
-            </a:r>
-            <a:r>
-              <a:rPr lang="es-ES" sz="1000" dirty="0" smtClean="0">
-                <a:solidFill>
-                  <a:schemeClr val="bg1"/>
-                </a:solidFill>
-                <a:latin typeface="Arial" pitchFamily="34" charset="0"/>
-                <a:cs typeface="Arial" pitchFamily="34" charset="0"/>
-              </a:rPr>
-              <a:t>electromagnética</a:t>
+              <a:t>uerza electromagnética</a:t>
             </a:r>
           </a:p>
           <a:p>
@@ -4304,17 +4264,7 @@
                 <a:latin typeface="Arial" pitchFamily="34" charset="0"/>
                 <a:cs typeface="Arial" pitchFamily="34" charset="0"/>
               </a:rPr>
-              <a:t>uerza nuclear </a:t>
-            </a:r>
-            <a:r>
-              <a:rPr lang="es-ES" sz="1000" dirty="0" smtClean="0">
-                <a:solidFill>
-                  <a:schemeClr val="bg1"/>
-                </a:solidFill>
-                <a:latin typeface="Arial" pitchFamily="34" charset="0"/>
-                <a:cs typeface="Arial" pitchFamily="34" charset="0"/>
-              </a:rPr>
-              <a:t>fuerte</a:t>
+              <a:t>uerza nuclear fuerte</a:t>
             </a:r>
           </a:p>
           <a:p>
@@ -4340,17 +4290,7 @@
                 <a:latin typeface="Arial" pitchFamily="34" charset="0"/>
                 <a:cs typeface="Arial" pitchFamily="34" charset="0"/>
               </a:rPr>
-              <a:t>uerza </a:t>
-            </a:r>
-            <a:r>
-              <a:rPr lang="es-ES" sz="1000" dirty="0" smtClean="0">
-                <a:solidFill>
-                  <a:schemeClr val="bg1"/>
-                </a:solidFill>
-                <a:latin typeface="Arial" pitchFamily="34" charset="0"/>
-                <a:cs typeface="Arial" pitchFamily="34" charset="0"/>
-              </a:rPr>
-              <a:t>nuclear débil</a:t>
+              <a:t>uerza nuclear débil</a:t>
             </a:r>
           </a:p>
           <a:p>
@@ -4376,17 +4316,7 @@
                 <a:latin typeface="Arial" pitchFamily="34" charset="0"/>
                 <a:cs typeface="Arial" pitchFamily="34" charset="0"/>
               </a:rPr>
-              <a:t>uerza </a:t>
-            </a:r>
-            <a:r>
-              <a:rPr lang="es-ES" sz="1000" dirty="0" smtClean="0">
-                <a:solidFill>
-                  <a:schemeClr val="bg1"/>
-                </a:solidFill>
-                <a:latin typeface="Arial" pitchFamily="34" charset="0"/>
-                <a:cs typeface="Arial" pitchFamily="34" charset="0"/>
-              </a:rPr>
-              <a:t>gravitacional</a:t>
+              <a:t>uerza gravitacional</a:t>
             </a:r>
           </a:p>
         </p:txBody>
@@ -4456,17 +4386,7 @@
                 <a:latin typeface="Arial" pitchFamily="34" charset="0"/>
                 <a:cs typeface="Arial" pitchFamily="34" charset="0"/>
               </a:rPr>
-              <a:t>uerzas </a:t>
-            </a:r>
-            <a:r>
-              <a:rPr lang="es-ES" sz="1000" dirty="0" smtClean="0">
-                <a:solidFill>
-                  <a:schemeClr val="bg1"/>
-                </a:solidFill>
-                <a:latin typeface="Arial" pitchFamily="34" charset="0"/>
-                <a:cs typeface="Arial" pitchFamily="34" charset="0"/>
-              </a:rPr>
-              <a:t>de campo</a:t>
+              <a:t>uerzas de campo</a:t>
             </a:r>
             <a:endParaRPr lang="es-ES" sz="1000" dirty="0">
               <a:solidFill>
@@ -4542,17 +4462,7 @@
                 <a:latin typeface="Arial" pitchFamily="34" charset="0"/>
                 <a:cs typeface="Arial" pitchFamily="34" charset="0"/>
               </a:rPr>
-              <a:t>uerpos </a:t>
-            </a:r>
-            <a:r>
-              <a:rPr lang="es-ES" sz="900" dirty="0" smtClean="0">
-                <a:solidFill>
-                  <a:schemeClr val="tx1"/>
-                </a:solidFill>
-                <a:latin typeface="Arial" pitchFamily="34" charset="0"/>
-                <a:cs typeface="Arial" pitchFamily="34" charset="0"/>
-              </a:rPr>
-              <a:t>en contacto</a:t>
+              <a:t>uerpos en contacto</a:t>
             </a:r>
           </a:p>
         </p:txBody>
@@ -4621,17 +4531,7 @@
                 <a:latin typeface="Arial" pitchFamily="34" charset="0"/>
                 <a:cs typeface="Arial" pitchFamily="34" charset="0"/>
               </a:rPr>
-              <a:t>nteracciones </a:t>
-            </a:r>
-            <a:r>
-              <a:rPr lang="es-ES" sz="900" dirty="0" smtClean="0">
-                <a:solidFill>
-                  <a:schemeClr val="tx1"/>
-                </a:solidFill>
-                <a:latin typeface="Arial" pitchFamily="34" charset="0"/>
-                <a:cs typeface="Arial" pitchFamily="34" charset="0"/>
-              </a:rPr>
-              <a:t>a distancia </a:t>
+              <a:t>nteracciones a distancia </a:t>
             </a:r>
           </a:p>
         </p:txBody>
@@ -4698,17 +4598,7 @@
                 <a:latin typeface="Arial" pitchFamily="34" charset="0"/>
                 <a:cs typeface="Arial" pitchFamily="34" charset="0"/>
               </a:rPr>
-              <a:t>o se </a:t>
-            </a:r>
-            <a:r>
-              <a:rPr lang="es-ES" sz="900" dirty="0" smtClean="0">
-                <a:solidFill>
-                  <a:schemeClr val="tx1"/>
-                </a:solidFill>
-                <a:latin typeface="Arial" pitchFamily="34" charset="0"/>
-                <a:cs typeface="Arial" pitchFamily="34" charset="0"/>
-              </a:rPr>
-              <a:t>requiere de contacto entre los cuerpos</a:t>
+              <a:t>o se requiere de contacto entre los cuerpos</a:t>
             </a:r>
           </a:p>
         </p:txBody>
@@ -4818,8 +4708,8 @@
         </p:nvSpPr>
         <p:spPr>
           <a:xfrm>
-            <a:off x="808890" y="3829908"/>
-            <a:ext cx="1417230" cy="383647"/>
+            <a:off x="489549" y="3829908"/>
+            <a:ext cx="1736571" cy="489468"/>
           </a:xfrm>
           <a:prstGeom prst="rect">
             <a:avLst/>
@@ -4862,64 +4752,17 @@
                 <a:latin typeface="Arial" pitchFamily="34" charset="0"/>
                 <a:cs typeface="Arial" pitchFamily="34" charset="0"/>
               </a:rPr>
-              <a:t>vectores con magnitud y dirección</a:t>
-            </a:r>
-          </a:p>
-        </p:txBody>
-      </p:sp>
-      <p:sp>
-        <p:nvSpPr>
-          <p:cNvPr id="41" name="40 Rectángulo"/>
-          <p:cNvSpPr/>
-          <p:nvPr/>
-        </p:nvSpPr>
-        <p:spPr>
-          <a:xfrm>
-            <a:off x="820942" y="4679888"/>
-            <a:ext cx="1417230" cy="383647"/>
-          </a:xfrm>
-          <a:prstGeom prst="rect">
-            <a:avLst/>
-          </a:prstGeom>
-          <a:solidFill>
-            <a:schemeClr val="bg1"/>
-          </a:solidFill>
-          <a:ln>
-            <a:solidFill>
-              <a:schemeClr val="tx1"/>
-            </a:solidFill>
-          </a:ln>
-        </p:spPr>
-        <p:style>
-          <a:lnRef idx="2">
-            <a:schemeClr val="accent1">
-              <a:shade val="50000"/>
-            </a:schemeClr>
-          </a:lnRef>
-          <a:fillRef idx="1">
-            <a:schemeClr val="accent1"/>
-          </a:fillRef>
-          <a:effectRef idx="0">
-            <a:schemeClr val="accent1"/>
-          </a:effectRef>
-          <a:fontRef idx="minor">
-            <a:schemeClr val="lt1"/>
-          </a:fontRef>
-        </p:style>
-        <p:txBody>
-          <a:bodyPr rtlCol="0" anchor="ctr"/>
-          <a:lstStyle/>
-          <a:p>
-            <a:pPr algn="ctr"/>
-            <a:r>
-              <a:rPr lang="es-ES" sz="900" dirty="0">
+              <a:t>Medio de vectores </a:t>
+            </a:r>
+            <a:r>
+              <a:rPr lang="es-ES" sz="900" dirty="0" smtClean="0">
                 <a:solidFill>
                   <a:schemeClr val="tx1"/>
                 </a:solidFill>
                 <a:latin typeface="Arial" pitchFamily="34" charset="0"/>
                 <a:cs typeface="Arial" pitchFamily="34" charset="0"/>
               </a:rPr>
-              <a:t>p</a:t>
+              <a:t>con </a:t>
             </a:r>
             <a:r>
               <a:rPr lang="es-ES" sz="900" dirty="0" smtClean="0">
@@ -4929,94 +4772,35 @@
                 <a:latin typeface="Arial" pitchFamily="34" charset="0"/>
                 <a:cs typeface="Arial" pitchFamily="34" charset="0"/>
               </a:rPr>
-              <a:t>unto de aplicación</a:t>
-            </a:r>
-          </a:p>
-        </p:txBody>
-      </p:sp>
-      <p:sp>
-        <p:nvSpPr>
-          <p:cNvPr id="44" name="43 Rectángulo"/>
-          <p:cNvSpPr/>
-          <p:nvPr/>
-        </p:nvSpPr>
-        <p:spPr>
-          <a:xfrm>
-            <a:off x="753512" y="5558299"/>
-            <a:ext cx="1472608" cy="383647"/>
-          </a:xfrm>
-          <a:prstGeom prst="rect">
-            <a:avLst/>
-          </a:prstGeom>
-          <a:solidFill>
-            <a:schemeClr val="bg1"/>
-          </a:solidFill>
-          <a:ln>
-            <a:solidFill>
-              <a:schemeClr val="tx1"/>
-            </a:solidFill>
-          </a:ln>
-        </p:spPr>
-        <p:style>
-          <a:lnRef idx="2">
-            <a:schemeClr val="accent1">
-              <a:shade val="50000"/>
-            </a:schemeClr>
-          </a:lnRef>
-          <a:fillRef idx="1">
-            <a:schemeClr val="accent1"/>
-          </a:fillRef>
-          <a:effectRef idx="0">
-            <a:schemeClr val="accent1"/>
-          </a:effectRef>
-          <a:fontRef idx="minor">
-            <a:schemeClr val="lt1"/>
-          </a:fontRef>
-        </p:style>
-        <p:txBody>
-          <a:bodyPr rtlCol="0" anchor="ctr"/>
-          <a:lstStyle/>
-          <a:p>
-            <a:r>
-              <a:rPr lang="es-ES" sz="900" dirty="0" err="1">
+              <a:t>magnitud, dirección, sentido u unidades (</a:t>
+            </a:r>
+            <a:r>
+              <a:rPr lang="es-ES" sz="900" dirty="0" err="1" smtClean="0">
                 <a:solidFill>
                   <a:schemeClr val="tx1"/>
                 </a:solidFill>
                 <a:latin typeface="Arial" pitchFamily="34" charset="0"/>
                 <a:cs typeface="Arial" pitchFamily="34" charset="0"/>
               </a:rPr>
-              <a:t>n</a:t>
-            </a:r>
-            <a:r>
-              <a:rPr lang="es-ES" sz="900" dirty="0" err="1" smtClean="0">
+              <a:t>newtons</a:t>
+            </a:r>
+            <a:r>
+              <a:rPr lang="es-ES" sz="900" dirty="0" smtClean="0">
                 <a:solidFill>
                   <a:schemeClr val="tx1"/>
                 </a:solidFill>
                 <a:latin typeface="Arial" pitchFamily="34" charset="0"/>
                 <a:cs typeface="Arial" pitchFamily="34" charset="0"/>
               </a:rPr>
-              <a:t>ewtons</a:t>
-            </a:r>
-            <a:r>
-              <a:rPr lang="es-ES" sz="900" dirty="0" smtClean="0">
-                <a:solidFill>
-                  <a:schemeClr val="tx1"/>
-                </a:solidFill>
-                <a:latin typeface="Arial" pitchFamily="34" charset="0"/>
-                <a:cs typeface="Arial" pitchFamily="34" charset="0"/>
-              </a:rPr>
-              <a:t> = kg m /s</a:t>
-            </a:r>
-            <a:r>
-              <a:rPr lang="es-ES" sz="900" baseline="30000" dirty="0" smtClean="0">
-                <a:solidFill>
-                  <a:schemeClr val="tx1"/>
-                </a:solidFill>
-                <a:latin typeface="Arial" pitchFamily="34" charset="0"/>
-                <a:cs typeface="Arial" pitchFamily="34" charset="0"/>
-              </a:rPr>
-              <a:t>2</a:t>
-            </a:r>
+              <a:t>)</a:t>
+            </a:r>
+            <a:endParaRPr lang="es-ES" sz="900" dirty="0" smtClean="0">
+              <a:solidFill>
+                <a:schemeClr val="tx1"/>
+              </a:solidFill>
+              <a:latin typeface="Arial" pitchFamily="34" charset="0"/>
+              <a:cs typeface="Arial" pitchFamily="34" charset="0"/>
+            </a:endParaRPr>
           </a:p>
         </p:txBody>
       </p:sp>
@@ -5028,7 +4812,7 @@
         </p:nvSpPr>
         <p:spPr>
           <a:xfrm>
-            <a:off x="820942" y="6380906"/>
+            <a:off x="532911" y="4919835"/>
             <a:ext cx="1441337" cy="383647"/>
           </a:xfrm>
           <a:prstGeom prst="rect">
@@ -5151,17 +4935,7 @@
                 <a:latin typeface="Arial" pitchFamily="34" charset="0"/>
                 <a:cs typeface="Arial" pitchFamily="34" charset="0"/>
               </a:rPr>
-              <a:t>tracción </a:t>
-            </a:r>
-            <a:r>
-              <a:rPr lang="es-ES" sz="900" dirty="0" smtClean="0">
-                <a:solidFill>
-                  <a:schemeClr val="tx1"/>
-                </a:solidFill>
-                <a:latin typeface="Arial" pitchFamily="34" charset="0"/>
-                <a:cs typeface="Arial" pitchFamily="34" charset="0"/>
-              </a:rPr>
-              <a:t>entre objetos</a:t>
+              <a:t>tracción entre objetos</a:t>
             </a:r>
           </a:p>
         </p:txBody>
@@ -5228,17 +5002,7 @@
                 <a:latin typeface="Arial" pitchFamily="34" charset="0"/>
                 <a:cs typeface="Arial" pitchFamily="34" charset="0"/>
               </a:rPr>
-              <a:t>a </a:t>
-            </a:r>
-            <a:r>
-              <a:rPr lang="es-ES" sz="900" dirty="0" smtClean="0">
-                <a:solidFill>
-                  <a:schemeClr val="tx1"/>
-                </a:solidFill>
-                <a:latin typeface="Arial" pitchFamily="34" charset="0"/>
-                <a:cs typeface="Arial" pitchFamily="34" charset="0"/>
-              </a:rPr>
-              <a:t>masa y la distancia entre los cuerpos</a:t>
+              <a:t>a masa y la distancia entre los cuerpos</a:t>
             </a:r>
           </a:p>
         </p:txBody>
@@ -5305,7 +5069,17 @@
                 <a:latin typeface="Arial" pitchFamily="34" charset="0"/>
                 <a:cs typeface="Arial" pitchFamily="34" charset="0"/>
               </a:rPr>
-              <a:t>ey </a:t>
+              <a:t>ey de la gravitación </a:t>
+            </a:r>
+            <a:r>
+              <a:rPr lang="es-ES" sz="900" dirty="0">
+                <a:solidFill>
+                  <a:schemeClr val="tx1"/>
+                </a:solidFill>
+                <a:latin typeface="Arial" pitchFamily="34" charset="0"/>
+                <a:cs typeface="Arial" pitchFamily="34" charset="0"/>
+              </a:rPr>
+              <a:t>u</a:t>
             </a:r>
             <a:r>
               <a:rPr lang="es-ES" sz="900" dirty="0" smtClean="0">
@@ -5315,45 +5089,8 @@
                 <a:latin typeface="Arial" pitchFamily="34" charset="0"/>
                 <a:cs typeface="Arial" pitchFamily="34" charset="0"/>
               </a:rPr>
-              <a:t>de </a:t>
-            </a:r>
-            <a:r>
-              <a:rPr lang="es-ES" sz="900" dirty="0" smtClean="0">
-                <a:solidFill>
-                  <a:schemeClr val="tx1"/>
-                </a:solidFill>
-                <a:latin typeface="Arial" pitchFamily="34" charset="0"/>
-                <a:cs typeface="Arial" pitchFamily="34" charset="0"/>
-              </a:rPr>
-              <a:t>la gravitación </a:t>
-            </a:r>
-            <a:r>
-              <a:rPr lang="es-ES" sz="900" dirty="0">
-                <a:solidFill>
-                  <a:schemeClr val="tx1"/>
-                </a:solidFill>
-                <a:latin typeface="Arial" pitchFamily="34" charset="0"/>
-                <a:cs typeface="Arial" pitchFamily="34" charset="0"/>
-              </a:rPr>
-              <a:t>u</a:t>
-            </a:r>
-            <a:r>
-              <a:rPr lang="es-ES" sz="900" dirty="0" smtClean="0">
-                <a:solidFill>
-                  <a:schemeClr val="tx1"/>
-                </a:solidFill>
-                <a:latin typeface="Arial" pitchFamily="34" charset="0"/>
-                <a:cs typeface="Arial" pitchFamily="34" charset="0"/>
-              </a:rPr>
               <a:t>niversal</a:t>
             </a:r>
-            <a:endParaRPr lang="es-ES" sz="900" dirty="0" smtClean="0">
-              <a:solidFill>
-                <a:schemeClr val="tx1"/>
-              </a:solidFill>
-              <a:latin typeface="Arial" pitchFamily="34" charset="0"/>
-              <a:cs typeface="Arial" pitchFamily="34" charset="0"/>
-            </a:endParaRPr>
           </a:p>
         </p:txBody>
       </p:sp>
@@ -5365,7 +5102,7 @@
         </p:nvSpPr>
         <p:spPr>
           <a:xfrm>
-            <a:off x="6623081" y="5468890"/>
+            <a:off x="6635856" y="5633070"/>
             <a:ext cx="1294521" cy="480330"/>
           </a:xfrm>
           <a:prstGeom prst="rect">
@@ -5419,17 +5156,7 @@
                 <a:latin typeface="Arial" pitchFamily="34" charset="0"/>
                 <a:cs typeface="Arial" pitchFamily="34" charset="0"/>
               </a:rPr>
-              <a:t>erca </a:t>
-            </a:r>
-            <a:r>
-              <a:rPr lang="es-ES" sz="900" dirty="0" smtClean="0">
-                <a:solidFill>
-                  <a:schemeClr val="tx1"/>
-                </a:solidFill>
-                <a:latin typeface="Arial" pitchFamily="34" charset="0"/>
-                <a:cs typeface="Arial" pitchFamily="34" charset="0"/>
-              </a:rPr>
-              <a:t>de la superficie terrestre se define el peso como W =mg</a:t>
+              <a:t>erca de la superficie terrestre se define el peso como W =mg</a:t>
             </a:r>
           </a:p>
         </p:txBody>
@@ -5498,17 +5225,7 @@
                 <a:latin typeface="Arial" pitchFamily="34" charset="0"/>
                 <a:cs typeface="Arial" pitchFamily="34" charset="0"/>
               </a:rPr>
-              <a:t>ontacto </a:t>
-            </a:r>
-            <a:r>
-              <a:rPr lang="es-ES" sz="900" dirty="0" smtClean="0">
-                <a:solidFill>
-                  <a:schemeClr val="tx1"/>
-                </a:solidFill>
-                <a:latin typeface="Arial" pitchFamily="34" charset="0"/>
-                <a:cs typeface="Arial" pitchFamily="34" charset="0"/>
-              </a:rPr>
-              <a:t>entre superficies o fuerzas aplicadas</a:t>
+              <a:t>ontacto entre superficies o fuerzas aplicadas</a:t>
             </a:r>
           </a:p>
         </p:txBody>
@@ -5575,17 +5292,7 @@
                 <a:latin typeface="Arial" pitchFamily="34" charset="0"/>
                 <a:cs typeface="Arial" pitchFamily="34" charset="0"/>
               </a:rPr>
-              <a:t>gentes </a:t>
-            </a:r>
-            <a:r>
-              <a:rPr lang="es-ES" sz="900" dirty="0" smtClean="0">
-                <a:solidFill>
-                  <a:schemeClr val="tx1"/>
-                </a:solidFill>
-                <a:latin typeface="Arial" pitchFamily="34" charset="0"/>
-                <a:cs typeface="Arial" pitchFamily="34" charset="0"/>
-              </a:rPr>
-              <a:t>externos o fuerzas de fricción</a:t>
+              <a:t>gentes externos o fuerzas de fricción</a:t>
             </a:r>
           </a:p>
         </p:txBody>
@@ -6157,93 +5864,17 @@
       </p:cxnSp>
       <p:cxnSp>
         <p:nvCxnSpPr>
-          <p:cNvPr id="146" name="145 Conector angular"/>
+          <p:cNvPr id="152" name="151 Conector angular"/>
           <p:cNvCxnSpPr>
             <a:stCxn id="40" idx="2"/>
-            <a:endCxn id="41" idx="0"/>
-          </p:cNvCxnSpPr>
-          <p:nvPr/>
-        </p:nvCxnSpPr>
-        <p:spPr>
-          <a:xfrm rot="16200000" flipH="1">
-            <a:off x="1290365" y="4440695"/>
-            <a:ext cx="466333" cy="12052"/>
-          </a:xfrm>
-          <a:prstGeom prst="bentConnector3">
-            <a:avLst/>
-          </a:prstGeom>
-          <a:ln>
-            <a:solidFill>
-              <a:schemeClr val="tx1"/>
-            </a:solidFill>
-          </a:ln>
-        </p:spPr>
-        <p:style>
-          <a:lnRef idx="1">
-            <a:schemeClr val="accent1"/>
-          </a:lnRef>
-          <a:fillRef idx="0">
-            <a:schemeClr val="accent1"/>
-          </a:fillRef>
-          <a:effectRef idx="0">
-            <a:schemeClr val="accent1"/>
-          </a:effectRef>
-          <a:fontRef idx="minor">
-            <a:schemeClr val="tx1"/>
-          </a:fontRef>
-        </p:style>
-      </p:cxnSp>
-      <p:cxnSp>
-        <p:nvCxnSpPr>
-          <p:cNvPr id="150" name="149 Conector angular"/>
-          <p:cNvCxnSpPr>
-            <a:stCxn id="41" idx="2"/>
-            <a:endCxn id="44" idx="0"/>
-          </p:cNvCxnSpPr>
-          <p:nvPr/>
-        </p:nvCxnSpPr>
-        <p:spPr>
-          <a:xfrm rot="5400000">
-            <a:off x="1262305" y="5291047"/>
-            <a:ext cx="494764" cy="39741"/>
-          </a:xfrm>
-          <a:prstGeom prst="bentConnector3">
-            <a:avLst/>
-          </a:prstGeom>
-          <a:ln>
-            <a:solidFill>
-              <a:schemeClr val="tx1"/>
-            </a:solidFill>
-          </a:ln>
-        </p:spPr>
-        <p:style>
-          <a:lnRef idx="1">
-            <a:schemeClr val="accent1"/>
-          </a:lnRef>
-          <a:fillRef idx="0">
-            <a:schemeClr val="accent1"/>
-          </a:fillRef>
-          <a:effectRef idx="0">
-            <a:schemeClr val="accent1"/>
-          </a:effectRef>
-          <a:fontRef idx="minor">
-            <a:schemeClr val="tx1"/>
-          </a:fontRef>
-        </p:style>
-      </p:cxnSp>
-      <p:cxnSp>
-        <p:nvCxnSpPr>
-          <p:cNvPr id="152" name="151 Conector angular"/>
-          <p:cNvCxnSpPr>
-            <a:stCxn id="44" idx="2"/>
             <a:endCxn id="46" idx="0"/>
           </p:cNvCxnSpPr>
           <p:nvPr/>
         </p:nvCxnSpPr>
         <p:spPr>
-          <a:xfrm rot="16200000" flipH="1">
-            <a:off x="1296233" y="6135528"/>
-            <a:ext cx="438960" cy="51795"/>
+          <a:xfrm rot="5400000">
+            <a:off x="1005479" y="4567478"/>
+            <a:ext cx="600459" cy="104255"/>
           </a:xfrm>
           <a:prstGeom prst="bentConnector3">
             <a:avLst/>
@@ -6394,8 +6025,8 @@
         </p:nvCxnSpPr>
         <p:spPr>
           <a:xfrm rot="16200000" flipH="1">
-            <a:off x="7017610" y="5216158"/>
-            <a:ext cx="498264" cy="7200"/>
+            <a:off x="6941907" y="5291860"/>
+            <a:ext cx="662444" cy="19975"/>
           </a:xfrm>
           <a:prstGeom prst="bentConnector3">
             <a:avLst/>
@@ -6905,14 +6536,7 @@
                 <a:latin typeface="Arial" pitchFamily="34" charset="0"/>
                 <a:cs typeface="Arial" pitchFamily="34" charset="0"/>
               </a:rPr>
-              <a:t>debida </a:t>
-            </a:r>
-            <a:r>
-              <a:rPr lang="es-ES" sz="900" dirty="0" smtClean="0">
-                <a:latin typeface="Arial" pitchFamily="34" charset="0"/>
-                <a:cs typeface="Arial" pitchFamily="34" charset="0"/>
-              </a:rPr>
-              <a:t>a</a:t>
+              <a:t>debida a</a:t>
             </a:r>
             <a:endParaRPr lang="es-ES" sz="900" dirty="0">
               <a:latin typeface="Arial" pitchFamily="34" charset="0"/>
@@ -6951,14 +6575,7 @@
                 <a:latin typeface="Arial" pitchFamily="34" charset="0"/>
                 <a:cs typeface="Arial" pitchFamily="34" charset="0"/>
               </a:rPr>
-              <a:t>debida </a:t>
-            </a:r>
-            <a:r>
-              <a:rPr lang="es-ES" sz="900" dirty="0" smtClean="0">
-                <a:latin typeface="Arial" pitchFamily="34" charset="0"/>
-                <a:cs typeface="Arial" pitchFamily="34" charset="0"/>
-              </a:rPr>
-              <a:t>a</a:t>
+              <a:t>debida a</a:t>
             </a:r>
             <a:endParaRPr lang="es-ES" sz="900" dirty="0">
               <a:latin typeface="Arial" pitchFamily="34" charset="0"/>
@@ -7043,14 +6660,7 @@
                 <a:latin typeface="Arial" pitchFamily="34" charset="0"/>
                 <a:cs typeface="Arial" pitchFamily="34" charset="0"/>
               </a:rPr>
-              <a:t>e </a:t>
-            </a:r>
-            <a:r>
-              <a:rPr lang="es-ES" sz="900" dirty="0" smtClean="0">
-                <a:latin typeface="Arial" pitchFamily="34" charset="0"/>
-                <a:cs typeface="Arial" pitchFamily="34" charset="0"/>
-              </a:rPr>
-              <a:t>representan por</a:t>
+              <a:t>e representan por</a:t>
             </a:r>
             <a:endParaRPr lang="es-ES" sz="900" dirty="0">
               <a:latin typeface="Arial" pitchFamily="34" charset="0"/>
@@ -7089,14 +6699,7 @@
                 <a:latin typeface="Arial" pitchFamily="34" charset="0"/>
                 <a:cs typeface="Arial" pitchFamily="34" charset="0"/>
               </a:rPr>
-              <a:t>donde </a:t>
-            </a:r>
-            <a:r>
-              <a:rPr lang="es-ES" sz="900" smtClean="0">
-                <a:latin typeface="Arial" pitchFamily="34" charset="0"/>
-                <a:cs typeface="Arial" pitchFamily="34" charset="0"/>
-              </a:rPr>
-              <a:t>intervienen</a:t>
+              <a:t>donde intervienen</a:t>
             </a:r>
             <a:endParaRPr lang="es-ES" sz="900" dirty="0">
               <a:latin typeface="Arial" pitchFamily="34" charset="0"/>
@@ -7107,14 +6710,14 @@
       </p:sp>
       <p:sp>
         <p:nvSpPr>
-          <p:cNvPr id="42" name="41 CuadroTexto"/>
+          <p:cNvPr id="52" name="51 CuadroTexto"/>
           <p:cNvSpPr txBox="1"/>
           <p:nvPr/>
         </p:nvSpPr>
         <p:spPr>
           <a:xfrm>
-            <a:off x="1181572" y="4322926"/>
-            <a:ext cx="720080" cy="230832"/>
+            <a:off x="6395228" y="4311815"/>
+            <a:ext cx="1563512" cy="230832"/>
           </a:xfrm>
           <a:prstGeom prst="rect">
             <a:avLst/>
@@ -7131,11 +6734,18 @@
           <a:p>
             <a:pPr algn="ctr"/>
             <a:r>
+              <a:rPr lang="es-ES" sz="900" dirty="0">
+                <a:latin typeface="Arial" pitchFamily="34" charset="0"/>
+                <a:cs typeface="Arial" pitchFamily="34" charset="0"/>
+              </a:rPr>
+              <a:t>s</a:t>
+            </a:r>
+            <a:r>
               <a:rPr lang="es-ES" sz="900" dirty="0" smtClean="0">
                 <a:latin typeface="Arial" pitchFamily="34" charset="0"/>
                 <a:cs typeface="Arial" pitchFamily="34" charset="0"/>
               </a:rPr>
-              <a:t>con un</a:t>
+              <a:t>e explica por  </a:t>
             </a:r>
             <a:endParaRPr lang="es-ES" sz="900" dirty="0">
               <a:latin typeface="Arial" pitchFamily="34" charset="0"/>
@@ -7146,14 +6756,14 @@
       </p:sp>
       <p:sp>
         <p:nvSpPr>
-          <p:cNvPr id="52" name="51 CuadroTexto"/>
+          <p:cNvPr id="66" name="65 CuadroTexto"/>
           <p:cNvSpPr txBox="1"/>
           <p:nvPr/>
         </p:nvSpPr>
         <p:spPr>
           <a:xfrm>
-            <a:off x="6395228" y="4311815"/>
-            <a:ext cx="1563512" cy="230832"/>
+            <a:off x="8086586" y="3950044"/>
+            <a:ext cx="720080" cy="369332"/>
           </a:xfrm>
           <a:prstGeom prst="rect">
             <a:avLst/>
@@ -7170,32 +6780,11 @@
           <a:p>
             <a:pPr algn="ctr"/>
             <a:r>
-              <a:rPr lang="es-ES" sz="900" dirty="0">
-                <a:latin typeface="Arial" pitchFamily="34" charset="0"/>
-                <a:cs typeface="Arial" pitchFamily="34" charset="0"/>
-              </a:rPr>
-              <a:t>s</a:t>
-            </a:r>
-            <a:r>
               <a:rPr lang="es-ES" sz="900" dirty="0" smtClean="0">
                 <a:latin typeface="Arial" pitchFamily="34" charset="0"/>
                 <a:cs typeface="Arial" pitchFamily="34" charset="0"/>
               </a:rPr>
-              <a:t>e </a:t>
-            </a:r>
-            <a:r>
-              <a:rPr lang="es-ES" sz="900" dirty="0" smtClean="0">
-                <a:latin typeface="Arial" pitchFamily="34" charset="0"/>
-                <a:cs typeface="Arial" pitchFamily="34" charset="0"/>
-              </a:rPr>
-              <a:t>explica por </a:t>
-            </a:r>
-            <a:r>
-              <a:rPr lang="es-ES" sz="900" dirty="0" smtClean="0">
-                <a:latin typeface="Arial" pitchFamily="34" charset="0"/>
-                <a:cs typeface="Arial" pitchFamily="34" charset="0"/>
-              </a:rPr>
-              <a:t> </a:t>
+              <a:t>ejercidas por</a:t>
             </a:r>
             <a:endParaRPr lang="es-ES" sz="900" dirty="0">
               <a:latin typeface="Arial" pitchFamily="34" charset="0"/>
@@ -7206,14 +6795,14 @@
       </p:sp>
       <p:sp>
         <p:nvSpPr>
-          <p:cNvPr id="66" name="65 CuadroTexto"/>
+          <p:cNvPr id="54" name="53 CuadroTexto"/>
           <p:cNvSpPr txBox="1"/>
           <p:nvPr/>
         </p:nvSpPr>
         <p:spPr>
           <a:xfrm>
-            <a:off x="8086586" y="3950044"/>
-            <a:ext cx="720080" cy="369332"/>
+            <a:off x="6716652" y="5142384"/>
+            <a:ext cx="1106929" cy="369332"/>
           </a:xfrm>
           <a:prstGeom prst="rect">
             <a:avLst/>
@@ -7230,18 +6819,18 @@
           <a:p>
             <a:pPr algn="ctr"/>
             <a:r>
+              <a:rPr lang="es-ES" sz="900" dirty="0">
+                <a:latin typeface="Arial" pitchFamily="34" charset="0"/>
+                <a:cs typeface="Arial" pitchFamily="34" charset="0"/>
+              </a:rPr>
+              <a:t>q</a:t>
+            </a:r>
+            <a:r>
               <a:rPr lang="es-ES" sz="900" dirty="0" smtClean="0">
                 <a:latin typeface="Arial" pitchFamily="34" charset="0"/>
                 <a:cs typeface="Arial" pitchFamily="34" charset="0"/>
               </a:rPr>
-              <a:t>ejercidas </a:t>
-            </a:r>
-            <a:r>
-              <a:rPr lang="es-ES" sz="900" dirty="0" smtClean="0">
-                <a:latin typeface="Arial" pitchFamily="34" charset="0"/>
-                <a:cs typeface="Arial" pitchFamily="34" charset="0"/>
-              </a:rPr>
-              <a:t>por</a:t>
+              <a:t>ue establece que</a:t>
             </a:r>
             <a:endParaRPr lang="es-ES" sz="900" dirty="0">
               <a:latin typeface="Arial" pitchFamily="34" charset="0"/>
@@ -7252,104 +6841,13 @@
       </p:sp>
       <p:sp>
         <p:nvSpPr>
-          <p:cNvPr id="43" name="42 CuadroTexto"/>
-          <p:cNvSpPr txBox="1"/>
-          <p:nvPr/>
-        </p:nvSpPr>
-        <p:spPr>
-          <a:xfrm>
-            <a:off x="1181571" y="5142384"/>
-            <a:ext cx="961553" cy="230832"/>
-          </a:xfrm>
-          <a:prstGeom prst="rect">
-            <a:avLst/>
-          </a:prstGeom>
-          <a:solidFill>
-            <a:schemeClr val="bg1"/>
-          </a:solidFill>
-        </p:spPr>
-        <p:txBody>
-          <a:bodyPr wrap="square" rtlCol="0">
-            <a:spAutoFit/>
-          </a:bodyPr>
-          <a:lstStyle/>
-          <a:p>
-            <a:r>
-              <a:rPr lang="es-ES" sz="900" dirty="0">
-                <a:latin typeface="Arial" pitchFamily="34" charset="0"/>
-                <a:cs typeface="Arial" pitchFamily="34" charset="0"/>
-              </a:rPr>
-              <a:t>y</a:t>
-            </a:r>
-            <a:r>
-              <a:rPr lang="es-ES" sz="900" dirty="0" smtClean="0">
-                <a:latin typeface="Arial" pitchFamily="34" charset="0"/>
-                <a:cs typeface="Arial" pitchFamily="34" charset="0"/>
-              </a:rPr>
-              <a:t> unidades </a:t>
-            </a:r>
-            <a:endParaRPr lang="es-ES" sz="900" dirty="0">
-              <a:latin typeface="Arial" pitchFamily="34" charset="0"/>
-              <a:cs typeface="Arial" pitchFamily="34" charset="0"/>
-            </a:endParaRPr>
-          </a:p>
-        </p:txBody>
-      </p:sp>
-      <p:sp>
-        <p:nvSpPr>
-          <p:cNvPr id="54" name="53 CuadroTexto"/>
-          <p:cNvSpPr txBox="1"/>
-          <p:nvPr/>
-        </p:nvSpPr>
-        <p:spPr>
-          <a:xfrm>
-            <a:off x="6716652" y="5142384"/>
-            <a:ext cx="1106929" cy="369332"/>
-          </a:xfrm>
-          <a:prstGeom prst="rect">
-            <a:avLst/>
-          </a:prstGeom>
-          <a:solidFill>
-            <a:schemeClr val="bg1"/>
-          </a:solidFill>
-        </p:spPr>
-        <p:txBody>
-          <a:bodyPr wrap="square" rtlCol="0">
-            <a:spAutoFit/>
-          </a:bodyPr>
-          <a:lstStyle/>
-          <a:p>
-            <a:pPr algn="ctr"/>
-            <a:r>
-              <a:rPr lang="es-ES" sz="900" dirty="0">
-                <a:latin typeface="Arial" pitchFamily="34" charset="0"/>
-                <a:cs typeface="Arial" pitchFamily="34" charset="0"/>
-              </a:rPr>
-              <a:t>q</a:t>
-            </a:r>
-            <a:r>
-              <a:rPr lang="es-ES" sz="900" dirty="0" smtClean="0">
-                <a:latin typeface="Arial" pitchFamily="34" charset="0"/>
-                <a:cs typeface="Arial" pitchFamily="34" charset="0"/>
-              </a:rPr>
-              <a:t>ue establece que</a:t>
-            </a:r>
-            <a:endParaRPr lang="es-ES" sz="900" dirty="0">
-              <a:latin typeface="Arial" pitchFamily="34" charset="0"/>
-              <a:cs typeface="Arial" pitchFamily="34" charset="0"/>
-            </a:endParaRPr>
-          </a:p>
-        </p:txBody>
-      </p:sp>
-      <p:sp>
-        <p:nvSpPr>
           <p:cNvPr id="45" name="44 CuadroTexto"/>
           <p:cNvSpPr txBox="1"/>
           <p:nvPr/>
         </p:nvSpPr>
         <p:spPr>
           <a:xfrm>
-            <a:off x="735714" y="6006480"/>
+            <a:off x="447683" y="4545409"/>
             <a:ext cx="1553598" cy="230832"/>
           </a:xfrm>
           <a:prstGeom prst="rect">

</xml_diff>